<commit_message>
added gantt chart to impl pres
</commit_message>
<xml_diff>
--- a/Implementation Sheet/Impl_sheet_presentation.pptx
+++ b/Implementation Sheet/Impl_sheet_presentation.pptx
@@ -559,6 +559,90 @@
     <p:extLst>
       <p:ext uri="{BB962C8B-B14F-4D97-AF65-F5344CB8AC3E}">
         <p14:creationId xmlns:p14="http://schemas.microsoft.com/office/powerpoint/2010/main" val="3752406060"/>
+      </p:ext>
+    </p:extLst>
+  </p:cSld>
+  <p:clrMapOvr>
+    <a:masterClrMapping/>
+  </p:clrMapOvr>
+</p:notes>
+</file>
+
+<file path=ppt/notesSlides/notesSlide2.xml><?xml version="1.0" encoding="utf-8"?>
+<p:notes xmlns:a="http://schemas.openxmlformats.org/drawingml/2006/main" xmlns:r="http://schemas.openxmlformats.org/officeDocument/2006/relationships" xmlns:p="http://schemas.openxmlformats.org/presentationml/2006/main">
+  <p:cSld>
+    <p:spTree>
+      <p:nvGrpSpPr>
+        <p:cNvPr id="1" name=""/>
+        <p:cNvGrpSpPr/>
+        <p:nvPr/>
+      </p:nvGrpSpPr>
+      <p:grpSpPr>
+        <a:xfrm>
+          <a:off x="0" y="0"/>
+          <a:ext cx="0" cy="0"/>
+          <a:chOff x="0" y="0"/>
+          <a:chExt cx="0" cy="0"/>
+        </a:xfrm>
+      </p:grpSpPr>
+      <p:sp>
+        <p:nvSpPr>
+          <p:cNvPr id="2" name="Folienbildplatzhalter 1"/>
+          <p:cNvSpPr>
+            <a:spLocks noGrp="1" noRot="1" noChangeAspect="1"/>
+          </p:cNvSpPr>
+          <p:nvPr>
+            <p:ph type="sldImg"/>
+          </p:nvPr>
+        </p:nvSpPr>
+        <p:spPr/>
+      </p:sp>
+      <p:sp>
+        <p:nvSpPr>
+          <p:cNvPr id="3" name="Notizenplatzhalter 2"/>
+          <p:cNvSpPr>
+            <a:spLocks noGrp="1"/>
+          </p:cNvSpPr>
+          <p:nvPr>
+            <p:ph type="body" idx="1"/>
+          </p:nvPr>
+        </p:nvSpPr>
+        <p:spPr/>
+        <p:txBody>
+          <a:bodyPr/>
+          <a:lstStyle/>
+          <a:p>
+            <a:endParaRPr lang="en-US" dirty="0"/>
+          </a:p>
+        </p:txBody>
+      </p:sp>
+      <p:sp>
+        <p:nvSpPr>
+          <p:cNvPr id="4" name="Foliennummernplatzhalter 3"/>
+          <p:cNvSpPr>
+            <a:spLocks noGrp="1"/>
+          </p:cNvSpPr>
+          <p:nvPr>
+            <p:ph type="sldNum" sz="quarter" idx="10"/>
+          </p:nvPr>
+        </p:nvSpPr>
+        <p:spPr/>
+        <p:txBody>
+          <a:bodyPr/>
+          <a:lstStyle/>
+          <a:p>
+            <a:fld id="{24D1A8A2-5E23-4C5A-A0E7-D0AE6A30F738}" type="slidenum">
+              <a:rPr lang="en-US" smtClean="0"/>
+              <a:t>3</a:t>
+            </a:fld>
+            <a:endParaRPr lang="en-US" dirty="0"/>
+          </a:p>
+        </p:txBody>
+      </p:sp>
+    </p:spTree>
+    <p:extLst>
+      <p:ext uri="{BB962C8B-B14F-4D97-AF65-F5344CB8AC3E}">
+        <p14:creationId xmlns:p14="http://schemas.microsoft.com/office/powerpoint/2010/main" val="686815287"/>
       </p:ext>
     </p:extLst>
   </p:cSld>
@@ -6601,7 +6685,12 @@
             <p:ph type="title"/>
           </p:nvPr>
         </p:nvSpPr>
-        <p:spPr/>
+        <p:spPr>
+          <a:xfrm>
+            <a:off x="677334" y="288878"/>
+            <a:ext cx="8596668" cy="1320800"/>
+          </a:xfrm>
+        </p:spPr>
         <p:txBody>
           <a:bodyPr/>
           <a:lstStyle/>
@@ -6614,25 +6703,6 @@
               <a:rPr lang="de-DE" dirty="0" err="1" smtClean="0"/>
               <a:t>schedule</a:t>
             </a:r>
-            <a:endParaRPr lang="en-US" dirty="0"/>
-          </a:p>
-        </p:txBody>
-      </p:sp>
-      <p:sp>
-        <p:nvSpPr>
-          <p:cNvPr id="3" name="Inhaltsplatzhalter 2"/>
-          <p:cNvSpPr>
-            <a:spLocks noGrp="1"/>
-          </p:cNvSpPr>
-          <p:nvPr>
-            <p:ph idx="1"/>
-          </p:nvPr>
-        </p:nvSpPr>
-        <p:spPr/>
-        <p:txBody>
-          <a:bodyPr/>
-          <a:lstStyle/>
-          <a:p>
             <a:endParaRPr lang="en-US" dirty="0"/>
           </a:p>
         </p:txBody>
@@ -6660,6 +6730,36 @@
           </a:p>
         </p:txBody>
       </p:sp>
+      <p:pic>
+        <p:nvPicPr>
+          <p:cNvPr id="5" name="Grafik 4"/>
+          <p:cNvPicPr>
+            <a:picLocks noChangeAspect="1"/>
+          </p:cNvPicPr>
+          <p:nvPr/>
+        </p:nvPicPr>
+        <p:blipFill>
+          <a:blip r:embed="rId3">
+            <a:extLst>
+              <a:ext uri="{28A0092B-C50C-407E-A947-70E740481C1C}">
+                <a14:useLocalDpi xmlns:a14="http://schemas.microsoft.com/office/drawing/2010/main" val="0"/>
+              </a:ext>
+            </a:extLst>
+          </a:blip>
+          <a:stretch>
+            <a:fillRect/>
+          </a:stretch>
+        </p:blipFill>
+        <p:spPr>
+          <a:xfrm>
+            <a:off x="238836" y="1177175"/>
+            <a:ext cx="11699955" cy="5549173"/>
+          </a:xfrm>
+          <a:prstGeom prst="rect">
+            <a:avLst/>
+          </a:prstGeom>
+        </p:spPr>
+      </p:pic>
     </p:spTree>
     <p:extLst>
       <p:ext uri="{BB962C8B-B14F-4D97-AF65-F5344CB8AC3E}">

</xml_diff>

<commit_message>
added git to presentation
</commit_message>
<xml_diff>
--- a/Implementation Sheet/Impl_sheet_presentation.pptx
+++ b/Implementation Sheet/Impl_sheet_presentation.pptx
@@ -2027,6 +2027,589 @@
 </file>
 
 <file path=ppt/notesSlides/notesSlide8.xml><?xml version="1.0" encoding="utf-8"?>
+<p:notes xmlns:a="http://schemas.openxmlformats.org/drawingml/2006/main" xmlns:r="http://schemas.openxmlformats.org/officeDocument/2006/relationships" xmlns:p="http://schemas.openxmlformats.org/presentationml/2006/main">
+  <p:cSld>
+    <p:spTree>
+      <p:nvGrpSpPr>
+        <p:cNvPr id="1" name=""/>
+        <p:cNvGrpSpPr/>
+        <p:nvPr/>
+      </p:nvGrpSpPr>
+      <p:grpSpPr>
+        <a:xfrm>
+          <a:off x="0" y="0"/>
+          <a:ext cx="0" cy="0"/>
+          <a:chOff x="0" y="0"/>
+          <a:chExt cx="0" cy="0"/>
+        </a:xfrm>
+      </p:grpSpPr>
+      <p:sp>
+        <p:nvSpPr>
+          <p:cNvPr id="2" name="Folienbildplatzhalter 1"/>
+          <p:cNvSpPr>
+            <a:spLocks noGrp="1" noRot="1" noChangeAspect="1"/>
+          </p:cNvSpPr>
+          <p:nvPr>
+            <p:ph type="sldImg"/>
+          </p:nvPr>
+        </p:nvSpPr>
+        <p:spPr/>
+      </p:sp>
+      <p:sp>
+        <p:nvSpPr>
+          <p:cNvPr id="3" name="Notizenplatzhalter 2"/>
+          <p:cNvSpPr>
+            <a:spLocks noGrp="1"/>
+          </p:cNvSpPr>
+          <p:nvPr>
+            <p:ph type="body" idx="1"/>
+          </p:nvPr>
+        </p:nvSpPr>
+        <p:spPr/>
+        <p:txBody>
+          <a:bodyPr/>
+          <a:lstStyle/>
+          <a:p>
+            <a:r>
+              <a:rPr lang="de-DE" u="sng" dirty="0" err="1" smtClean="0"/>
+              <a:t>Merging</a:t>
+            </a:r>
+            <a:r>
+              <a:rPr lang="de-DE" u="sng" baseline="0" dirty="0" smtClean="0"/>
+              <a:t>: </a:t>
+            </a:r>
+            <a:r>
+              <a:rPr lang="de-DE" u="none" baseline="0" dirty="0" err="1" smtClean="0"/>
+              <a:t>branch</a:t>
+            </a:r>
+            <a:r>
+              <a:rPr lang="de-DE" u="none" baseline="0" dirty="0" smtClean="0"/>
+              <a:t> </a:t>
+            </a:r>
+            <a:r>
+              <a:rPr lang="de-DE" u="none" baseline="0" dirty="0" err="1" smtClean="0"/>
+              <a:t>need</a:t>
+            </a:r>
+            <a:r>
+              <a:rPr lang="de-DE" u="none" baseline="0" dirty="0" smtClean="0"/>
+              <a:t> </a:t>
+            </a:r>
+            <a:r>
+              <a:rPr lang="de-DE" u="none" baseline="0" dirty="0" err="1" smtClean="0"/>
+              <a:t>to</a:t>
+            </a:r>
+            <a:r>
+              <a:rPr lang="de-DE" u="none" baseline="0" dirty="0" smtClean="0"/>
+              <a:t> </a:t>
+            </a:r>
+            <a:r>
+              <a:rPr lang="de-DE" u="none" baseline="0" dirty="0" err="1" smtClean="0"/>
+              <a:t>be</a:t>
+            </a:r>
+            <a:r>
+              <a:rPr lang="de-DE" u="none" baseline="0" dirty="0" smtClean="0"/>
+              <a:t> </a:t>
+            </a:r>
+            <a:r>
+              <a:rPr lang="de-DE" u="none" baseline="0" dirty="0" err="1" smtClean="0"/>
+              <a:t>up</a:t>
+            </a:r>
+            <a:r>
+              <a:rPr lang="de-DE" u="none" baseline="0" dirty="0" smtClean="0"/>
+              <a:t> </a:t>
+            </a:r>
+            <a:r>
+              <a:rPr lang="de-DE" u="none" baseline="0" dirty="0" err="1" smtClean="0"/>
+              <a:t>to</a:t>
+            </a:r>
+            <a:r>
+              <a:rPr lang="de-DE" u="none" baseline="0" dirty="0" smtClean="0"/>
+              <a:t> </a:t>
+            </a:r>
+            <a:r>
+              <a:rPr lang="de-DE" u="none" baseline="0" dirty="0" err="1" smtClean="0"/>
+              <a:t>date</a:t>
+            </a:r>
+            <a:r>
+              <a:rPr lang="de-DE" u="none" baseline="0" dirty="0" smtClean="0"/>
+              <a:t> </a:t>
+            </a:r>
+            <a:r>
+              <a:rPr lang="de-DE" u="none" baseline="0" dirty="0" smtClean="0">
+                <a:sym typeface="Wingdings" panose="05000000000000000000" pitchFamily="2" charset="2"/>
+              </a:rPr>
+              <a:t></a:t>
+            </a:r>
+            <a:r>
+              <a:rPr lang="de-DE" u="none" baseline="0" dirty="0" smtClean="0"/>
+              <a:t> pull </a:t>
+            </a:r>
+            <a:r>
+              <a:rPr lang="de-DE" u="none" baseline="0" dirty="0" err="1" smtClean="0"/>
+              <a:t>request</a:t>
+            </a:r>
+            <a:r>
+              <a:rPr lang="de-DE" u="none" baseline="0" dirty="0" smtClean="0"/>
+              <a:t> </a:t>
+            </a:r>
+            <a:r>
+              <a:rPr lang="de-DE" u="none" baseline="0" dirty="0" smtClean="0">
+                <a:sym typeface="Wingdings" panose="05000000000000000000" pitchFamily="2" charset="2"/>
+              </a:rPr>
+              <a:t></a:t>
+            </a:r>
+            <a:r>
+              <a:rPr lang="en-US" sz="1200" kern="1200" dirty="0" smtClean="0">
+                <a:solidFill>
+                  <a:schemeClr val="tx1"/>
+                </a:solidFill>
+                <a:effectLst/>
+                <a:latin typeface="+mn-lt"/>
+                <a:ea typeface="+mn-ea"/>
+                <a:cs typeface="+mn-cs"/>
+              </a:rPr>
+              <a:t>colleagues </a:t>
+            </a:r>
+            <a:r>
+              <a:rPr lang="en-US" sz="1200" b="1" kern="1200" dirty="0" smtClean="0">
+                <a:solidFill>
+                  <a:schemeClr val="tx1"/>
+                </a:solidFill>
+                <a:effectLst/>
+                <a:latin typeface="+mn-lt"/>
+                <a:ea typeface="+mn-ea"/>
+                <a:cs typeface="+mn-cs"/>
+              </a:rPr>
+              <a:t>review</a:t>
+            </a:r>
+            <a:r>
+              <a:rPr lang="en-US" sz="1200" b="1" kern="1200" baseline="0" dirty="0" smtClean="0">
+                <a:solidFill>
+                  <a:schemeClr val="tx1"/>
+                </a:solidFill>
+                <a:effectLst/>
+                <a:latin typeface="+mn-lt"/>
+                <a:ea typeface="+mn-ea"/>
+                <a:cs typeface="+mn-cs"/>
+              </a:rPr>
+              <a:t> or suggest changes</a:t>
+            </a:r>
+          </a:p>
+          <a:p>
+            <a:r>
+              <a:rPr lang="de-DE" sz="1200" u="sng" kern="1200" baseline="0" dirty="0" smtClean="0">
+                <a:solidFill>
+                  <a:schemeClr val="tx1"/>
+                </a:solidFill>
+                <a:effectLst/>
+                <a:latin typeface="+mn-lt"/>
+                <a:ea typeface="+mn-ea"/>
+                <a:cs typeface="+mn-cs"/>
+              </a:rPr>
+              <a:t>Travis</a:t>
+            </a:r>
+            <a:r>
+              <a:rPr lang="de-DE" sz="1200" u="none" kern="1200" baseline="0" dirty="0" smtClean="0">
+                <a:solidFill>
+                  <a:schemeClr val="tx1"/>
+                </a:solidFill>
+                <a:effectLst/>
+                <a:latin typeface="+mn-lt"/>
+                <a:ea typeface="+mn-ea"/>
+                <a:cs typeface="+mn-cs"/>
+              </a:rPr>
+              <a:t>: </a:t>
+            </a:r>
+            <a:r>
+              <a:rPr lang="de-DE" sz="1200" u="none" kern="1200" baseline="0" dirty="0" err="1" smtClean="0">
+                <a:solidFill>
+                  <a:schemeClr val="tx1"/>
+                </a:solidFill>
+                <a:effectLst/>
+                <a:latin typeface="+mn-lt"/>
+                <a:ea typeface="+mn-ea"/>
+                <a:cs typeface="+mn-cs"/>
+              </a:rPr>
+              <a:t>shows</a:t>
+            </a:r>
+            <a:r>
+              <a:rPr lang="de-DE" sz="1200" u="none" kern="1200" baseline="0" dirty="0" smtClean="0">
+                <a:solidFill>
+                  <a:schemeClr val="tx1"/>
+                </a:solidFill>
+                <a:effectLst/>
+                <a:latin typeface="+mn-lt"/>
+                <a:ea typeface="+mn-ea"/>
+                <a:cs typeface="+mn-cs"/>
+              </a:rPr>
+              <a:t> </a:t>
+            </a:r>
+            <a:r>
+              <a:rPr lang="de-DE" sz="1200" u="none" kern="1200" baseline="0" dirty="0" err="1" smtClean="0">
+                <a:solidFill>
+                  <a:schemeClr val="tx1"/>
+                </a:solidFill>
+                <a:effectLst/>
+                <a:latin typeface="+mn-lt"/>
+                <a:ea typeface="+mn-ea"/>
+                <a:cs typeface="+mn-cs"/>
+              </a:rPr>
+              <a:t>if</a:t>
+            </a:r>
+            <a:r>
+              <a:rPr lang="de-DE" sz="1200" u="none" kern="1200" baseline="0" dirty="0" smtClean="0">
+                <a:solidFill>
+                  <a:schemeClr val="tx1"/>
+                </a:solidFill>
+                <a:effectLst/>
+                <a:latin typeface="+mn-lt"/>
+                <a:ea typeface="+mn-ea"/>
+                <a:cs typeface="+mn-cs"/>
+              </a:rPr>
+              <a:t> </a:t>
+            </a:r>
+            <a:r>
+              <a:rPr lang="de-DE" sz="1200" b="1" u="none" kern="1200" baseline="0" dirty="0" err="1" smtClean="0">
+                <a:solidFill>
+                  <a:schemeClr val="tx1"/>
+                </a:solidFill>
+                <a:effectLst/>
+                <a:latin typeface="+mn-lt"/>
+                <a:ea typeface="+mn-ea"/>
+                <a:cs typeface="+mn-cs"/>
+              </a:rPr>
+              <a:t>tests</a:t>
+            </a:r>
+            <a:r>
+              <a:rPr lang="de-DE" sz="1200" b="1" u="none" kern="1200" baseline="0" dirty="0" smtClean="0">
+                <a:solidFill>
+                  <a:schemeClr val="tx1"/>
+                </a:solidFill>
+                <a:effectLst/>
+                <a:latin typeface="+mn-lt"/>
+                <a:ea typeface="+mn-ea"/>
+                <a:cs typeface="+mn-cs"/>
+              </a:rPr>
+              <a:t> </a:t>
+            </a:r>
+            <a:r>
+              <a:rPr lang="de-DE" sz="1200" b="1" u="none" kern="1200" baseline="0" dirty="0" err="1" smtClean="0">
+                <a:solidFill>
+                  <a:schemeClr val="tx1"/>
+                </a:solidFill>
+                <a:effectLst/>
+                <a:latin typeface="+mn-lt"/>
+                <a:ea typeface="+mn-ea"/>
+                <a:cs typeface="+mn-cs"/>
+              </a:rPr>
+              <a:t>are</a:t>
+            </a:r>
+            <a:r>
+              <a:rPr lang="de-DE" sz="1200" b="1" u="none" kern="1200" baseline="0" dirty="0" smtClean="0">
+                <a:solidFill>
+                  <a:schemeClr val="tx1"/>
+                </a:solidFill>
+                <a:effectLst/>
+                <a:latin typeface="+mn-lt"/>
+                <a:ea typeface="+mn-ea"/>
+                <a:cs typeface="+mn-cs"/>
+              </a:rPr>
+              <a:t> </a:t>
+            </a:r>
+            <a:r>
+              <a:rPr lang="de-DE" sz="1200" b="1" u="none" kern="1200" baseline="0" dirty="0" err="1" smtClean="0">
+                <a:solidFill>
+                  <a:schemeClr val="tx1"/>
+                </a:solidFill>
+                <a:effectLst/>
+                <a:latin typeface="+mn-lt"/>
+                <a:ea typeface="+mn-ea"/>
+                <a:cs typeface="+mn-cs"/>
+              </a:rPr>
+              <a:t>succesful</a:t>
+            </a:r>
+            <a:endParaRPr lang="de-DE" sz="1200" b="1" u="sng" kern="1200" baseline="0" dirty="0" smtClean="0">
+              <a:solidFill>
+                <a:schemeClr val="tx1"/>
+              </a:solidFill>
+              <a:effectLst/>
+              <a:latin typeface="+mn-lt"/>
+              <a:ea typeface="+mn-ea"/>
+              <a:cs typeface="+mn-cs"/>
+            </a:endParaRPr>
+          </a:p>
+          <a:p>
+            <a:r>
+              <a:rPr lang="de-DE" sz="1200" u="sng" kern="1200" baseline="0" dirty="0" err="1" smtClean="0">
+                <a:solidFill>
+                  <a:schemeClr val="tx1"/>
+                </a:solidFill>
+                <a:effectLst/>
+                <a:latin typeface="+mn-lt"/>
+                <a:ea typeface="+mn-ea"/>
+                <a:cs typeface="+mn-cs"/>
+              </a:rPr>
+              <a:t>Codeclimate</a:t>
+            </a:r>
+            <a:r>
+              <a:rPr lang="de-DE" sz="1200" u="sng" kern="1200" baseline="0" dirty="0" smtClean="0">
+                <a:solidFill>
+                  <a:schemeClr val="tx1"/>
+                </a:solidFill>
+                <a:effectLst/>
+                <a:latin typeface="+mn-lt"/>
+                <a:ea typeface="+mn-ea"/>
+                <a:cs typeface="+mn-cs"/>
+              </a:rPr>
+              <a:t>: </a:t>
+            </a:r>
+            <a:r>
+              <a:rPr lang="en-US" sz="1200" kern="1200" dirty="0" smtClean="0">
+                <a:solidFill>
+                  <a:schemeClr val="tx1"/>
+                </a:solidFill>
+                <a:effectLst/>
+                <a:latin typeface="+mn-lt"/>
+                <a:ea typeface="+mn-ea"/>
+                <a:cs typeface="+mn-cs"/>
+              </a:rPr>
+              <a:t>looks at the code </a:t>
+            </a:r>
+            <a:r>
+              <a:rPr lang="en-US" sz="1200" kern="1200" dirty="0" smtClean="0">
+                <a:solidFill>
+                  <a:schemeClr val="tx1"/>
+                </a:solidFill>
+                <a:effectLst/>
+                <a:latin typeface="+mn-lt"/>
+                <a:ea typeface="+mn-ea"/>
+                <a:cs typeface="+mn-cs"/>
+                <a:sym typeface="Wingdings" panose="05000000000000000000" pitchFamily="2" charset="2"/>
+              </a:rPr>
+              <a:t></a:t>
+            </a:r>
+            <a:r>
+              <a:rPr lang="en-GB" sz="1200" kern="1200" dirty="0" smtClean="0">
+                <a:solidFill>
+                  <a:schemeClr val="tx1"/>
+                </a:solidFill>
+                <a:effectLst/>
+                <a:latin typeface="+mn-lt"/>
+                <a:ea typeface="+mn-ea"/>
+                <a:cs typeface="+mn-cs"/>
+              </a:rPr>
+              <a:t>decide </a:t>
+            </a:r>
+            <a:r>
+              <a:rPr lang="en-GB" sz="1200" b="1" kern="1200" dirty="0" smtClean="0">
+                <a:solidFill>
+                  <a:schemeClr val="tx1"/>
+                </a:solidFill>
+                <a:effectLst/>
+                <a:latin typeface="+mn-lt"/>
+                <a:ea typeface="+mn-ea"/>
+                <a:cs typeface="+mn-cs"/>
+              </a:rPr>
+              <a:t>how readable and complex </a:t>
+            </a:r>
+            <a:r>
+              <a:rPr lang="en-GB" sz="1200" kern="1200" dirty="0" smtClean="0">
+                <a:solidFill>
+                  <a:schemeClr val="tx1"/>
+                </a:solidFill>
+                <a:effectLst/>
+                <a:latin typeface="+mn-lt"/>
+                <a:ea typeface="+mn-ea"/>
+                <a:cs typeface="+mn-cs"/>
+              </a:rPr>
+              <a:t>the code</a:t>
+            </a:r>
+            <a:r>
+              <a:rPr lang="en-GB" sz="1200" kern="1200" baseline="0" dirty="0" smtClean="0">
+                <a:solidFill>
+                  <a:schemeClr val="tx1"/>
+                </a:solidFill>
+                <a:effectLst/>
+                <a:latin typeface="+mn-lt"/>
+                <a:ea typeface="+mn-ea"/>
+                <a:cs typeface="+mn-cs"/>
+              </a:rPr>
+              <a:t>, is </a:t>
+            </a:r>
+            <a:r>
+              <a:rPr lang="en-GB" sz="1200" b="1" kern="1200" baseline="0" dirty="0" smtClean="0">
+                <a:solidFill>
+                  <a:schemeClr val="tx1"/>
+                </a:solidFill>
+                <a:effectLst/>
+                <a:latin typeface="+mn-lt"/>
+                <a:ea typeface="+mn-ea"/>
+                <a:cs typeface="+mn-cs"/>
+              </a:rPr>
+              <a:t>PEP8</a:t>
+            </a:r>
+            <a:r>
+              <a:rPr lang="en-GB" sz="1200" kern="1200" baseline="0" dirty="0" smtClean="0">
+                <a:solidFill>
+                  <a:schemeClr val="tx1"/>
+                </a:solidFill>
+                <a:effectLst/>
+                <a:latin typeface="+mn-lt"/>
+                <a:ea typeface="+mn-ea"/>
+                <a:cs typeface="+mn-cs"/>
+              </a:rPr>
+              <a:t> </a:t>
+            </a:r>
+            <a:r>
+              <a:rPr lang="en-GB" sz="1200" b="1" kern="1200" baseline="0" dirty="0" smtClean="0">
+                <a:solidFill>
+                  <a:schemeClr val="tx1"/>
+                </a:solidFill>
+                <a:effectLst/>
+                <a:latin typeface="+mn-lt"/>
+                <a:ea typeface="+mn-ea"/>
+                <a:cs typeface="+mn-cs"/>
+              </a:rPr>
+              <a:t>conform</a:t>
+            </a:r>
+            <a:r>
+              <a:rPr lang="en-GB" sz="1200" kern="1200" baseline="0" dirty="0" smtClean="0">
+                <a:solidFill>
+                  <a:schemeClr val="tx1"/>
+                </a:solidFill>
+                <a:effectLst/>
+                <a:latin typeface="+mn-lt"/>
+                <a:ea typeface="+mn-ea"/>
+                <a:cs typeface="+mn-cs"/>
+              </a:rPr>
+              <a:t> and shows </a:t>
+            </a:r>
+            <a:r>
+              <a:rPr lang="en-GB" sz="1200" b="1" kern="1200" baseline="0" dirty="0" smtClean="0">
+                <a:solidFill>
+                  <a:schemeClr val="tx1"/>
+                </a:solidFill>
+                <a:effectLst/>
+                <a:latin typeface="+mn-lt"/>
+                <a:ea typeface="+mn-ea"/>
+                <a:cs typeface="+mn-cs"/>
+              </a:rPr>
+              <a:t>test coverage</a:t>
+            </a:r>
+          </a:p>
+          <a:p>
+            <a:endParaRPr lang="en-GB" sz="1200" kern="1200" baseline="0" dirty="0" smtClean="0">
+              <a:solidFill>
+                <a:schemeClr val="tx1"/>
+              </a:solidFill>
+              <a:effectLst/>
+              <a:latin typeface="+mn-lt"/>
+              <a:ea typeface="+mn-ea"/>
+              <a:cs typeface="+mn-cs"/>
+            </a:endParaRPr>
+          </a:p>
+          <a:p>
+            <a:r>
+              <a:rPr lang="en-GB" sz="1200" u="none" kern="1200" baseline="0" dirty="0" smtClean="0">
+                <a:solidFill>
+                  <a:schemeClr val="tx1"/>
+                </a:solidFill>
+                <a:effectLst/>
+                <a:latin typeface="+mn-lt"/>
+                <a:ea typeface="+mn-ea"/>
+                <a:cs typeface="+mn-cs"/>
+              </a:rPr>
+              <a:t>Travis and </a:t>
+            </a:r>
+            <a:r>
+              <a:rPr lang="en-GB" sz="1200" u="none" kern="1200" baseline="0" dirty="0" err="1" smtClean="0">
+                <a:solidFill>
+                  <a:schemeClr val="tx1"/>
+                </a:solidFill>
+                <a:effectLst/>
+                <a:latin typeface="+mn-lt"/>
+                <a:ea typeface="+mn-ea"/>
+                <a:cs typeface="+mn-cs"/>
+              </a:rPr>
+              <a:t>codeclimate</a:t>
+            </a:r>
+            <a:r>
+              <a:rPr lang="en-GB" sz="1200" u="none" kern="1200" baseline="0" dirty="0" smtClean="0">
+                <a:solidFill>
+                  <a:schemeClr val="tx1"/>
+                </a:solidFill>
+                <a:effectLst/>
+                <a:latin typeface="+mn-lt"/>
+                <a:ea typeface="+mn-ea"/>
+                <a:cs typeface="+mn-cs"/>
+              </a:rPr>
+              <a:t> are </a:t>
+            </a:r>
+            <a:r>
+              <a:rPr lang="en-GB" sz="1200" b="1" u="none" kern="1200" baseline="0" dirty="0" smtClean="0">
+                <a:solidFill>
+                  <a:schemeClr val="tx1"/>
+                </a:solidFill>
+                <a:effectLst/>
+                <a:latin typeface="+mn-lt"/>
+                <a:ea typeface="+mn-ea"/>
+                <a:cs typeface="+mn-cs"/>
+              </a:rPr>
+              <a:t>optional</a:t>
+            </a:r>
+            <a:r>
+              <a:rPr lang="en-GB" sz="1200" u="none" kern="1200" baseline="0" dirty="0" smtClean="0">
+                <a:solidFill>
+                  <a:schemeClr val="tx1"/>
+                </a:solidFill>
+                <a:effectLst/>
+                <a:latin typeface="+mn-lt"/>
+                <a:ea typeface="+mn-ea"/>
+                <a:cs typeface="+mn-cs"/>
+              </a:rPr>
+              <a:t> because we hadn’t time to clean up some code passages (like labeller)</a:t>
+            </a:r>
+            <a:endParaRPr lang="en-US" u="none" dirty="0"/>
+          </a:p>
+        </p:txBody>
+      </p:sp>
+      <p:sp>
+        <p:nvSpPr>
+          <p:cNvPr id="4" name="Foliennummernplatzhalter 3"/>
+          <p:cNvSpPr>
+            <a:spLocks noGrp="1"/>
+          </p:cNvSpPr>
+          <p:nvPr>
+            <p:ph type="sldNum" sz="quarter" idx="10"/>
+          </p:nvPr>
+        </p:nvSpPr>
+        <p:spPr/>
+        <p:txBody>
+          <a:bodyPr/>
+          <a:lstStyle/>
+          <a:p>
+            <a:fld id="{24D1A8A2-5E23-4C5A-A0E7-D0AE6A30F738}" type="slidenum">
+              <a:rPr lang="en-US" smtClean="0"/>
+              <a:t>8</a:t>
+            </a:fld>
+            <a:endParaRPr lang="en-US" dirty="0"/>
+          </a:p>
+        </p:txBody>
+      </p:sp>
+    </p:spTree>
+    <p:extLst>
+      <p:ext uri="{BB962C8B-B14F-4D97-AF65-F5344CB8AC3E}">
+        <p14:creationId xmlns:p14="http://schemas.microsoft.com/office/powerpoint/2010/main" val="2605662189"/>
+      </p:ext>
+    </p:extLst>
+  </p:cSld>
+  <p:clrMapOvr>
+    <a:masterClrMapping/>
+  </p:clrMapOvr>
+</p:notes>
+</file>
+
+<file path=ppt/notesSlides/notesSlide9.xml><?xml version="1.0" encoding="utf-8"?>
 <p:notes xmlns:a="http://schemas.openxmlformats.org/drawingml/2006/main" xmlns:r="http://schemas.openxmlformats.org/officeDocument/2006/relationships" xmlns:p="http://schemas.openxmlformats.org/presentationml/2006/main">
   <p:cSld>
     <p:spTree>
@@ -8265,7 +8848,12 @@
             <p:ph idx="1"/>
           </p:nvPr>
         </p:nvSpPr>
-        <p:spPr/>
+        <p:spPr>
+          <a:xfrm>
+            <a:off x="677334" y="1768704"/>
+            <a:ext cx="8596668" cy="3880773"/>
+          </a:xfrm>
+        </p:spPr>
         <p:txBody>
           <a:bodyPr/>
           <a:lstStyle/>
@@ -8530,7 +9118,7 @@
         </p:nvSpPr>
         <p:spPr>
           <a:xfrm>
-            <a:off x="677334" y="2720147"/>
+            <a:off x="677334" y="2297159"/>
             <a:ext cx="7211072" cy="2309053"/>
           </a:xfrm>
         </p:spPr>
@@ -9112,7 +9700,12 @@
             <p:ph idx="1"/>
           </p:nvPr>
         </p:nvSpPr>
-        <p:spPr/>
+        <p:spPr>
+          <a:xfrm>
+            <a:off x="571587" y="1569651"/>
+            <a:ext cx="8596668" cy="3880773"/>
+          </a:xfrm>
+        </p:spPr>
         <p:txBody>
           <a:bodyPr/>
           <a:lstStyle/>
@@ -9511,6 +10104,111 @@
             <a:r>
               <a:rPr lang="de-DE" dirty="0" smtClean="0"/>
               <a:t>GIT:</a:t>
+            </a:r>
+          </a:p>
+          <a:p>
+            <a:pPr lvl="1"/>
+            <a:r>
+              <a:rPr lang="de-DE" dirty="0" err="1" smtClean="0"/>
+              <a:t>Merging</a:t>
+            </a:r>
+            <a:r>
+              <a:rPr lang="de-DE" dirty="0" smtClean="0"/>
+              <a:t> on </a:t>
+            </a:r>
+            <a:r>
+              <a:rPr lang="de-DE" dirty="0" err="1" smtClean="0"/>
+              <a:t>the</a:t>
+            </a:r>
+            <a:r>
+              <a:rPr lang="de-DE" dirty="0" smtClean="0"/>
+              <a:t> </a:t>
+            </a:r>
+            <a:r>
+              <a:rPr lang="de-DE" dirty="0" err="1" smtClean="0"/>
+              <a:t>master</a:t>
+            </a:r>
+            <a:r>
+              <a:rPr lang="de-DE" dirty="0" smtClean="0"/>
+              <a:t> was </a:t>
+            </a:r>
+            <a:r>
+              <a:rPr lang="de-DE" dirty="0" err="1" smtClean="0"/>
+              <a:t>destricted</a:t>
+            </a:r>
+            <a:endParaRPr lang="de-DE" dirty="0" smtClean="0"/>
+          </a:p>
+          <a:p>
+            <a:pPr lvl="2"/>
+            <a:r>
+              <a:rPr lang="de-DE" dirty="0" smtClean="0"/>
+              <a:t>Create a pull </a:t>
+            </a:r>
+            <a:r>
+              <a:rPr lang="de-DE" dirty="0" err="1" smtClean="0"/>
+              <a:t>request</a:t>
+            </a:r>
+            <a:r>
+              <a:rPr lang="de-DE" dirty="0" smtClean="0"/>
+              <a:t> </a:t>
+            </a:r>
+          </a:p>
+          <a:p>
+            <a:pPr lvl="2"/>
+            <a:r>
+              <a:rPr lang="en-US" dirty="0" smtClean="0"/>
+              <a:t>Colleagues </a:t>
+            </a:r>
+            <a:r>
+              <a:rPr lang="de-DE" dirty="0" err="1" smtClean="0"/>
+              <a:t>have</a:t>
+            </a:r>
+            <a:r>
+              <a:rPr lang="de-DE" dirty="0" smtClean="0"/>
+              <a:t> </a:t>
+            </a:r>
+            <a:r>
+              <a:rPr lang="de-DE" dirty="0" err="1" smtClean="0"/>
+              <a:t>to</a:t>
+            </a:r>
+            <a:r>
+              <a:rPr lang="de-DE" dirty="0" smtClean="0"/>
+              <a:t> </a:t>
+            </a:r>
+            <a:r>
+              <a:rPr lang="de-DE" dirty="0" err="1" smtClean="0"/>
+              <a:t>review</a:t>
+            </a:r>
+            <a:r>
+              <a:rPr lang="de-DE" dirty="0" smtClean="0"/>
+              <a:t> </a:t>
+            </a:r>
+            <a:r>
+              <a:rPr lang="de-DE" dirty="0" err="1" smtClean="0"/>
+              <a:t>the</a:t>
+            </a:r>
+            <a:r>
+              <a:rPr lang="de-DE" dirty="0" smtClean="0"/>
+              <a:t> </a:t>
+            </a:r>
+            <a:r>
+              <a:rPr lang="de-DE" dirty="0" err="1" smtClean="0"/>
+              <a:t>changes</a:t>
+            </a:r>
+            <a:endParaRPr lang="en-US" dirty="0"/>
+          </a:p>
+          <a:p>
+            <a:pPr lvl="1"/>
+            <a:r>
+              <a:rPr lang="de-DE" dirty="0" smtClean="0"/>
+              <a:t>Travis</a:t>
+            </a:r>
+          </a:p>
+          <a:p>
+            <a:pPr lvl="1"/>
+            <a:r>
+              <a:rPr lang="de-DE" dirty="0" err="1" smtClean="0"/>
+              <a:t>CodeClimate</a:t>
             </a:r>
             <a:endParaRPr lang="en-US" dirty="0"/>
           </a:p>

</xml_diff>

<commit_message>
edited big classdiagram (changed gernerator module to collector module and added keys)
</commit_message>
<xml_diff>
--- a/Implementation Sheet/Impl_sheet_presentation.pptx
+++ b/Implementation Sheet/Impl_sheet_presentation.pptx
@@ -2677,7 +2677,7 @@
           <a:bodyPr/>
           <a:lstStyle/>
           <a:p>
-            <a:endParaRPr lang="en-US"/>
+            <a:endParaRPr lang="en-US" dirty="0"/>
           </a:p>
         </p:txBody>
       </p:sp>
@@ -9820,13 +9820,8 @@
             </a:r>
             <a:r>
               <a:rPr lang="de-DE" dirty="0" smtClean="0"/>
-              <a:t>: </a:t>
-            </a:r>
-            <a:r>
-              <a:rPr lang="de-DE" dirty="0" smtClean="0"/>
-              <a:t>200</a:t>
-            </a:r>
-            <a:endParaRPr lang="de-DE" dirty="0" smtClean="0"/>
+              <a:t>: 200</a:t>
+            </a:r>
           </a:p>
           <a:p>
             <a:r>
@@ -10369,7 +10364,7 @@
       </p:sp>
       <p:pic>
         <p:nvPicPr>
-          <p:cNvPr id="3" name="Grafik 2"/>
+          <p:cNvPr id="4" name="Grafik 3"/>
           <p:cNvPicPr>
             <a:picLocks noChangeAspect="1"/>
           </p:cNvPicPr>
@@ -10389,8 +10384,8 @@
         </p:blipFill>
         <p:spPr>
           <a:xfrm>
-            <a:off x="503917" y="79719"/>
-            <a:ext cx="8428415" cy="6689570"/>
+            <a:off x="876383" y="444322"/>
+            <a:ext cx="7969213" cy="6014434"/>
           </a:xfrm>
           <a:prstGeom prst="rect">
             <a:avLst/>

</xml_diff>